<commit_message>
Updated to the latest Bot Builder witha associated tweaks. Added Welcome Message for PigLatin Bot.
</commit_message>
<xml_diff>
--- a/Presentations/IntroBotFramework.pptx
+++ b/Presentations/IntroBotFramework.pptx
@@ -131,6 +131,10 @@
 </p:presentation>
 </file>
 
+<file path=ppt/revisionInfo.xml><?xml version="1.0" encoding="utf-8"?>
+<p1510:revInfo xmlns:a="http://schemas.openxmlformats.org/drawingml/2006/main" xmlns:r="http://schemas.openxmlformats.org/officeDocument/2006/relationships" xmlns:p1510="http://schemas.microsoft.com/office/powerpoint/2015/10/main"/>
+</file>
+
 <file path=ppt/diagrams/colors1.xml><?xml version="1.0" encoding="utf-8"?>
 <dgm:colorsDef xmlns:dgm="http://schemas.openxmlformats.org/drawingml/2006/diagram" xmlns:a="http://schemas.openxmlformats.org/drawingml/2006/main" uniqueId="urn:microsoft.com/office/officeart/2005/8/colors/accent1_2">
   <dgm:title val=""/>
@@ -8352,7 +8356,7 @@
 <dgm:dataModel xmlns:dgm="http://schemas.openxmlformats.org/drawingml/2006/diagram" xmlns:a="http://schemas.openxmlformats.org/drawingml/2006/main">
   <dgm:ptLst>
     <dgm:pt modelId="{85931001-9E05-42C3-B7B7-5275F06FCC17}" type="doc">
-      <dgm:prSet loTypeId="urn:microsoft.com/office/officeart/2005/8/layout/hProcess9" loCatId="process" qsTypeId="urn:microsoft.com/office/officeart/2005/8/quickstyle/simple1" qsCatId="simple" csTypeId="urn:microsoft.com/office/officeart/2005/8/colors/accent1_2" csCatId="accent1"/>
+      <dgm:prSet loTypeId="urn:microsoft.com/office/officeart/2005/8/layout/hProcess9" loCatId="process" qsTypeId="urn:microsoft.com/office/officeart/2005/8/quickstyle/simple1" qsCatId="simple" csTypeId="urn:microsoft.com/office/officeart/2005/8/colors/accent1_2" csCatId="accent1" phldr="1"/>
       <dgm:spPr/>
       <dgm:t>
         <a:bodyPr/>
@@ -8370,8 +8374,8 @@
         <a:lstStyle/>
         <a:p>
           <a:r>
-            <a:rPr lang="en-US"/>
-            <a:t>What is a Bot?</a:t>
+            <a:rPr lang="en-US" dirty="0"/>
+            <a:t>What is a Chatbot?</a:t>
           </a:r>
         </a:p>
       </dgm:t>
@@ -8406,8 +8410,8 @@
         <a:lstStyle/>
         <a:p>
           <a:r>
-            <a:rPr lang="en-US"/>
-            <a:t>A Bot From 0 to Deployment</a:t>
+            <a:rPr lang="en-US" dirty="0"/>
+            <a:t>A Chatbot From 0 to Deployment</a:t>
           </a:r>
         </a:p>
       </dgm:t>
@@ -12139,8 +12143,8 @@
             <a:buNone/>
           </a:pPr>
           <a:r>
-            <a:rPr lang="en-US" sz="2100" kern="1200"/>
-            <a:t>What is a Bot?</a:t>
+            <a:rPr lang="en-US" sz="2100" kern="1200" dirty="0"/>
+            <a:t>What is a Chatbot?</a:t>
           </a:r>
         </a:p>
       </dsp:txBody>
@@ -12216,8 +12220,8 @@
             <a:buNone/>
           </a:pPr>
           <a:r>
-            <a:rPr lang="en-US" sz="2100" kern="1200"/>
-            <a:t>A Bot From 0 to Deployment</a:t>
+            <a:rPr lang="en-US" sz="2100" kern="1200" dirty="0"/>
+            <a:t>A Chatbot From 0 to Deployment</a:t>
           </a:r>
         </a:p>
       </dsp:txBody>
@@ -38873,7 +38877,7 @@
           <a:p>
             <a:fld id="{48A87A34-81AB-432B-8DAE-1953F412C126}" type="datetimeFigureOut">
               <a:rPr lang="en-US" dirty="0"/>
-              <a:t>3/11/2017</a:t>
+              <a:t>9/27/2017</a:t>
             </a:fld>
             <a:endParaRPr lang="en-US" dirty="0"/>
           </a:p>
@@ -39135,7 +39139,7 @@
           <a:p>
             <a:fld id="{48A87A34-81AB-432B-8DAE-1953F412C126}" type="datetimeFigureOut">
               <a:rPr lang="en-US" dirty="0"/>
-              <a:t>3/11/2017</a:t>
+              <a:t>9/27/2017</a:t>
             </a:fld>
             <a:endParaRPr lang="en-US" dirty="0"/>
           </a:p>
@@ -39326,7 +39330,7 @@
           <a:p>
             <a:fld id="{48A87A34-81AB-432B-8DAE-1953F412C126}" type="datetimeFigureOut">
               <a:rPr lang="en-US" dirty="0"/>
-              <a:t>3/11/2017</a:t>
+              <a:t>9/27/2017</a:t>
             </a:fld>
             <a:endParaRPr lang="en-US" dirty="0"/>
           </a:p>
@@ -39584,7 +39588,7 @@
           <a:p>
             <a:fld id="{48A87A34-81AB-432B-8DAE-1953F412C126}" type="datetimeFigureOut">
               <a:rPr lang="en-US" dirty="0"/>
-              <a:t>3/11/2017</a:t>
+              <a:t>9/27/2017</a:t>
             </a:fld>
             <a:endParaRPr lang="en-US" dirty="0"/>
           </a:p>
@@ -40013,7 +40017,7 @@
           <a:p>
             <a:fld id="{48A87A34-81AB-432B-8DAE-1953F412C126}" type="datetimeFigureOut">
               <a:rPr lang="en-US" dirty="0"/>
-              <a:t>3/11/2017</a:t>
+              <a:t>9/27/2017</a:t>
             </a:fld>
             <a:endParaRPr lang="en-US" dirty="0"/>
           </a:p>
@@ -40554,7 +40558,7 @@
           <a:p>
             <a:fld id="{48A87A34-81AB-432B-8DAE-1953F412C126}" type="datetimeFigureOut">
               <a:rPr lang="en-US" dirty="0"/>
-              <a:t>3/11/2017</a:t>
+              <a:t>9/27/2017</a:t>
             </a:fld>
             <a:endParaRPr lang="en-US" dirty="0"/>
           </a:p>
@@ -41269,7 +41273,7 @@
           <a:p>
             <a:fld id="{48A87A34-81AB-432B-8DAE-1953F412C126}" type="datetimeFigureOut">
               <a:rPr lang="en-US" dirty="0"/>
-              <a:t>3/11/2017</a:t>
+              <a:t>9/27/2017</a:t>
             </a:fld>
             <a:endParaRPr lang="en-US" dirty="0"/>
           </a:p>
@@ -41434,7 +41438,7 @@
           <a:p>
             <a:fld id="{48A87A34-81AB-432B-8DAE-1953F412C126}" type="datetimeFigureOut">
               <a:rPr lang="en-US" dirty="0"/>
-              <a:t>3/11/2017</a:t>
+              <a:t>9/27/2017</a:t>
             </a:fld>
             <a:endParaRPr lang="en-US" dirty="0"/>
           </a:p>
@@ -41609,7 +41613,7 @@
           <a:p>
             <a:fld id="{48A87A34-81AB-432B-8DAE-1953F412C126}" type="datetimeFigureOut">
               <a:rPr lang="en-US" dirty="0"/>
-              <a:t>3/11/2017</a:t>
+              <a:t>9/27/2017</a:t>
             </a:fld>
             <a:endParaRPr lang="en-US" dirty="0"/>
           </a:p>
@@ -41774,7 +41778,7 @@
           <a:p>
             <a:fld id="{48A87A34-81AB-432B-8DAE-1953F412C126}" type="datetimeFigureOut">
               <a:rPr lang="en-US" dirty="0"/>
-              <a:t>3/11/2017</a:t>
+              <a:t>9/27/2017</a:t>
             </a:fld>
             <a:endParaRPr lang="en-US" dirty="0"/>
           </a:p>
@@ -42019,7 +42023,7 @@
           <a:p>
             <a:fld id="{48A87A34-81AB-432B-8DAE-1953F412C126}" type="datetimeFigureOut">
               <a:rPr lang="en-US" dirty="0"/>
-              <a:t>3/11/2017</a:t>
+              <a:t>9/27/2017</a:t>
             </a:fld>
             <a:endParaRPr lang="en-US" dirty="0"/>
           </a:p>
@@ -42246,7 +42250,7 @@
           <a:p>
             <a:fld id="{48A87A34-81AB-432B-8DAE-1953F412C126}" type="datetimeFigureOut">
               <a:rPr lang="en-US" dirty="0"/>
-              <a:t>3/11/2017</a:t>
+              <a:t>9/27/2017</a:t>
             </a:fld>
             <a:endParaRPr lang="en-US" dirty="0"/>
           </a:p>
@@ -42622,7 +42626,7 @@
           <a:p>
             <a:fld id="{48A87A34-81AB-432B-8DAE-1953F412C126}" type="datetimeFigureOut">
               <a:rPr lang="en-US" dirty="0"/>
-              <a:t>3/11/2017</a:t>
+              <a:t>9/27/2017</a:t>
             </a:fld>
             <a:endParaRPr lang="en-US" dirty="0"/>
           </a:p>
@@ -42735,7 +42739,7 @@
           <a:p>
             <a:fld id="{48A87A34-81AB-432B-8DAE-1953F412C126}" type="datetimeFigureOut">
               <a:rPr lang="en-US" dirty="0"/>
-              <a:t>3/11/2017</a:t>
+              <a:t>9/27/2017</a:t>
             </a:fld>
             <a:endParaRPr lang="en-US" dirty="0"/>
           </a:p>
@@ -42825,7 +42829,7 @@
           <a:p>
             <a:fld id="{48A87A34-81AB-432B-8DAE-1953F412C126}" type="datetimeFigureOut">
               <a:rPr lang="en-US" dirty="0"/>
-              <a:t>3/11/2017</a:t>
+              <a:t>9/27/2017</a:t>
             </a:fld>
             <a:endParaRPr lang="en-US" dirty="0"/>
           </a:p>
@@ -43069,7 +43073,7 @@
           <a:p>
             <a:fld id="{48A87A34-81AB-432B-8DAE-1953F412C126}" type="datetimeFigureOut">
               <a:rPr lang="en-US" dirty="0"/>
-              <a:t>3/11/2017</a:t>
+              <a:t>9/27/2017</a:t>
             </a:fld>
             <a:endParaRPr lang="en-US" dirty="0"/>
           </a:p>
@@ -43344,7 +43348,7 @@
           <a:p>
             <a:fld id="{48A87A34-81AB-432B-8DAE-1953F412C126}" type="datetimeFigureOut">
               <a:rPr lang="en-US" dirty="0"/>
-              <a:t>3/11/2017</a:t>
+              <a:t>9/27/2017</a:t>
             </a:fld>
             <a:endParaRPr lang="en-US" dirty="0"/>
           </a:p>
@@ -46407,7 +46411,7 @@
             <a:fld id="{48A87A34-81AB-432B-8DAE-1953F412C126}" type="datetimeFigureOut">
               <a:rPr lang="en-US" dirty="0"/>
               <a:pPr/>
-              <a:t>3/11/2017</a:t>
+              <a:t>9/27/2017</a:t>
             </a:fld>
             <a:endParaRPr lang="en-US" dirty="0"/>
           </a:p>
@@ -46833,7 +46837,12 @@
             <p:ph type="ctrTitle"/>
           </p:nvPr>
         </p:nvSpPr>
-        <p:spPr/>
+        <p:spPr>
+          <a:xfrm>
+            <a:off x="1876424" y="1122363"/>
+            <a:ext cx="5300075" cy="2387600"/>
+          </a:xfrm>
+        </p:spPr>
         <p:txBody>
           <a:bodyPr/>
           <a:lstStyle/>
@@ -46891,6 +46900,36 @@
           </a:p>
         </p:txBody>
       </p:sp>
+      <p:pic>
+        <p:nvPicPr>
+          <p:cNvPr id="7" name="Picture 6">
+            <a:extLst>
+              <a:ext uri="{FF2B5EF4-FFF2-40B4-BE49-F238E27FC236}">
+                <a16:creationId xmlns:a16="http://schemas.microsoft.com/office/drawing/2014/main" id="{52E0FFC1-0FD8-455C-B0EE-2CC2B387233A}"/>
+              </a:ext>
+            </a:extLst>
+          </p:cNvPr>
+          <p:cNvPicPr>
+            <a:picLocks noChangeAspect="1"/>
+          </p:cNvPicPr>
+          <p:nvPr/>
+        </p:nvPicPr>
+        <p:blipFill>
+          <a:blip r:embed="rId3"/>
+          <a:stretch>
+            <a:fillRect/>
+          </a:stretch>
+        </p:blipFill>
+        <p:spPr>
+          <a:xfrm>
+            <a:off x="7402530" y="934735"/>
+            <a:ext cx="3857625" cy="4762500"/>
+          </a:xfrm>
+          <a:prstGeom prst="rect">
+            <a:avLst/>
+          </a:prstGeom>
+        </p:spPr>
+      </p:pic>
     </p:spTree>
     <p:extLst>
       <p:ext uri="{BB962C8B-B14F-4D97-AF65-F5344CB8AC3E}">
@@ -47680,8 +47719,32 @@
         </p:nvSpPr>
         <p:spPr/>
         <p:txBody>
-          <a:bodyPr/>
+          <a:bodyPr>
+            <a:normAutofit fontScale="92500" lnSpcReduction="20000"/>
+          </a:bodyPr>
           <a:lstStyle/>
+          <a:p>
+            <a:r>
+              <a:rPr lang="en-US" dirty="0"/>
+              <a:t>Programming the Microsoft Bot Framework: A Multiplatform Approach to Building Chatbots/MS Press: </a:t>
+            </a:r>
+            <a:r>
+              <a:rPr lang="en-US" dirty="0">
+                <a:hlinkClick r:id="rId2"/>
+              </a:rPr>
+              <a:t>https://aka.ms/botbook</a:t>
+            </a:r>
+            <a:r>
+              <a:rPr lang="en-US" dirty="0"/>
+              <a:t> </a:t>
+            </a:r>
+          </a:p>
+          <a:p>
+            <a:r>
+              <a:rPr lang="en-US" dirty="0"/>
+              <a:t>Programming the Microsoft Bot Framework (Video): </a:t>
+            </a:r>
+          </a:p>
           <a:p>
             <a:r>
               <a:rPr lang="en-US" dirty="0"/>
@@ -47689,7 +47752,7 @@
             </a:r>
             <a:r>
               <a:rPr lang="en-US" dirty="0">
-                <a:hlinkClick r:id="rId2"/>
+                <a:hlinkClick r:id="rId3"/>
               </a:rPr>
               <a:t>https://dev.botframework.com/</a:t>
             </a:r>
@@ -47700,16 +47763,12 @@
           </a:p>
           <a:p>
             <a:r>
-              <a:rPr lang="en-US" dirty="0" err="1"/>
-              <a:t>Chatbots</a:t>
-            </a:r>
-            <a:r>
               <a:rPr lang="en-US" dirty="0"/>
-              <a:t> Magazine: </a:t>
+              <a:t>Chatbots Magazine: </a:t>
             </a:r>
             <a:r>
               <a:rPr lang="en-US" dirty="0">
-                <a:hlinkClick r:id="rId3"/>
+                <a:hlinkClick r:id="rId4"/>
               </a:rPr>
               <a:t>https://chatbotsmagazine.com/</a:t>
             </a:r>
@@ -47726,7 +47785,7 @@
             </a:r>
             <a:r>
               <a:rPr lang="en-US" dirty="0">
-                <a:hlinkClick r:id="rId4"/>
+                <a:hlinkClick r:id="rId5"/>
               </a:rPr>
               <a:t>http://venturebeat.com/category/bots/</a:t>
             </a:r>
@@ -47737,34 +47796,14 @@
           </a:p>
           <a:p>
             <a:r>
-              <a:rPr lang="en-US"/>
-              <a:t>Facebook Chatbot </a:t>
-            </a:r>
-            <a:r>
               <a:rPr lang="en-US" dirty="0"/>
-              <a:t>group: </a:t>
-            </a:r>
-            <a:r>
-              <a:rPr lang="en-US" dirty="0">
-                <a:hlinkClick r:id="rId5"/>
-              </a:rPr>
-              <a:t>http://bit.ly/1rCWzkS</a:t>
-            </a:r>
-            <a:r>
-              <a:rPr lang="en-US" dirty="0"/>
-              <a:t> </a:t>
-            </a:r>
-          </a:p>
-          <a:p>
-            <a:r>
-              <a:rPr lang="en-US" dirty="0"/>
-              <a:t>Free MVA Course – Getting Started with Bots: </a:t>
+              <a:t>Facebook Chatbot group: </a:t>
             </a:r>
             <a:r>
               <a:rPr lang="en-US" dirty="0">
                 <a:hlinkClick r:id="rId6"/>
               </a:rPr>
-              <a:t>http://bit.ly/2dnH4tV</a:t>
+              <a:t>http://bit.ly/1rCWzkS</a:t>
             </a:r>
             <a:r>
               <a:rPr lang="en-US" dirty="0"/>
@@ -47782,15 +47821,7 @@
             </a:r>
             <a:r>
               <a:rPr lang="en-US" dirty="0"/>
-              <a:t>, #</a:t>
-            </a:r>
-            <a:r>
-              <a:rPr lang="en-US" dirty="0" err="1"/>
-              <a:t>chatbots</a:t>
-            </a:r>
-            <a:r>
-              <a:rPr lang="en-US" dirty="0"/>
-              <a:t>, and #</a:t>
+              <a:t>, #chatbots, and #</a:t>
             </a:r>
             <a:r>
               <a:rPr lang="en-US" dirty="0" err="1"/>
@@ -47862,7 +47893,7 @@
             <p:ph idx="1"/>
             <p:extLst>
               <p:ext uri="{D42A27DB-BD31-4B8C-83A1-F6EECF244321}">
-                <p14:modId xmlns:p14="http://schemas.microsoft.com/office/powerpoint/2010/main" val="2026261916"/>
+                <p14:modId xmlns:p14="http://schemas.microsoft.com/office/powerpoint/2010/main" val="459055450"/>
               </p:ext>
             </p:extLst>
           </p:nvPr>
@@ -47986,7 +48017,7 @@
               <a:rPr lang="en-US" dirty="0">
                 <a:hlinkClick r:id="rId3"/>
               </a:rPr>
-              <a:t>http://mayoster.blogspot.com/</a:t>
+              <a:t>http://blog.botcontext.com/</a:t>
             </a:r>
             <a:r>
               <a:rPr lang="en-US" dirty="0"/>

</xml_diff>